<commit_message>
Added dynamic objects and updated the readme
</commit_message>
<xml_diff>
--- a/C++ Game Engine.pptx
+++ b/C++ Game Engine.pptx
@@ -10,8 +10,12 @@
     <p:sldId id="258" r:id="rId4"/>
     <p:sldId id="259" r:id="rId5"/>
     <p:sldId id="260" r:id="rId6"/>
-    <p:sldId id="261" r:id="rId7"/>
-    <p:sldId id="262" r:id="rId8"/>
+    <p:sldId id="265" r:id="rId7"/>
+    <p:sldId id="261" r:id="rId8"/>
+    <p:sldId id="262" r:id="rId9"/>
+    <p:sldId id="264" r:id="rId10"/>
+    <p:sldId id="263" r:id="rId11"/>
+    <p:sldId id="266" r:id="rId12"/>
   </p:sldIdLst>
   <p:sldSz cx="12192000" cy="6858000"/>
   <p:notesSz cx="6858000" cy="9144000"/>
@@ -110,6 +114,11 @@
       </a:defRPr>
     </a:lvl9pPr>
   </p:defaultTextStyle>
+  <p:extLst>
+    <p:ext uri="{EFAFB233-063F-42B5-8137-9DF3F51BA10A}">
+      <p15:sldGuideLst xmlns:p15="http://schemas.microsoft.com/office/powerpoint/2012/main"/>
+    </p:ext>
+  </p:extLst>
 </p:presentation>
 </file>
 
@@ -449,7 +458,7 @@
             <a:fld id="{5923F103-BC34-4FE4-A40E-EDDEECFDA5D0}" type="datetimeFigureOut">
               <a:rPr lang="en-US" dirty="0"/>
               <a:pPr/>
-              <a:t>2/23/2021</a:t>
+              <a:t>3/2/2021</a:t>
             </a:fld>
             <a:endParaRPr lang="en-US" dirty="0"/>
           </a:p>
@@ -1533,7 +1542,7 @@
           <a:p>
             <a:fld id="{923A1CC3-2375-41D4-9E03-427CAF2A4C1A}" type="datetimeFigureOut">
               <a:rPr lang="en-US" dirty="0"/>
-              <a:t>2/23/2021</a:t>
+              <a:t>3/2/2021</a:t>
             </a:fld>
             <a:endParaRPr lang="en-US" dirty="0"/>
           </a:p>
@@ -2509,7 +2518,7 @@
           <a:p>
             <a:fld id="{AFF16868-8199-4C2C-A5B1-63AEE139F88E}" type="datetimeFigureOut">
               <a:rPr lang="en-US" dirty="0"/>
-              <a:t>2/23/2021</a:t>
+              <a:t>3/2/2021</a:t>
             </a:fld>
             <a:endParaRPr lang="en-US" dirty="0"/>
           </a:p>
@@ -3639,7 +3648,7 @@
           <a:p>
             <a:fld id="{AAD9FF7F-6988-44CC-821B-644E70CD2F73}" type="datetimeFigureOut">
               <a:rPr lang="en-US" dirty="0"/>
-              <a:t>2/23/2021</a:t>
+              <a:t>3/2/2021</a:t>
             </a:fld>
             <a:endParaRPr lang="en-US" dirty="0"/>
           </a:p>
@@ -4668,7 +4677,7 @@
           <a:p>
             <a:fld id="{5C12C299-16B2-4475-990D-751901EACC14}" type="datetimeFigureOut">
               <a:rPr lang="en-US" dirty="0"/>
-              <a:t>2/23/2021</a:t>
+              <a:t>3/2/2021</a:t>
             </a:fld>
             <a:endParaRPr lang="en-US" dirty="0"/>
           </a:p>
@@ -5324,7 +5333,7 @@
           <a:p>
             <a:fld id="{9FE86839-B9D8-4651-8783-F325ECE74E65}" type="datetimeFigureOut">
               <a:rPr lang="en-US" dirty="0"/>
-              <a:t>2/23/2021</a:t>
+              <a:t>3/2/2021</a:t>
             </a:fld>
             <a:endParaRPr lang="en-US" dirty="0"/>
           </a:p>
@@ -6181,7 +6190,7 @@
           <a:p>
             <a:fld id="{FD484F64-32F6-45C5-931F-ADC1662401D0}" type="datetimeFigureOut">
               <a:rPr lang="en-US" dirty="0"/>
-              <a:t>2/23/2021</a:t>
+              <a:t>3/2/2021</a:t>
             </a:fld>
             <a:endParaRPr lang="en-US" dirty="0"/>
           </a:p>
@@ -6367,7 +6376,7 @@
           <a:p>
             <a:fld id="{53086D93-FCAC-47E0-A2EE-787E62CA814C}" type="datetimeFigureOut">
               <a:rPr lang="en-US" dirty="0"/>
-              <a:t>2/23/2021</a:t>
+              <a:t>3/2/2021</a:t>
             </a:fld>
             <a:endParaRPr lang="en-US" dirty="0"/>
           </a:p>
@@ -7335,7 +7344,7 @@
           <a:p>
             <a:fld id="{CDA879A6-0FD0-4734-A311-86BFCA472E6E}" type="datetimeFigureOut">
               <a:rPr lang="en-US" dirty="0"/>
-              <a:t>2/23/2021</a:t>
+              <a:t>3/2/2021</a:t>
             </a:fld>
             <a:endParaRPr lang="en-US" dirty="0"/>
           </a:p>
@@ -7542,7 +7551,7 @@
           <a:p>
             <a:fld id="{19C9CA7B-DFD4-44B5-8C60-D14B8CD1FB59}" type="datetimeFigureOut">
               <a:rPr lang="en-US" dirty="0"/>
-              <a:t>2/23/2021</a:t>
+              <a:t>3/2/2021</a:t>
             </a:fld>
             <a:endParaRPr lang="en-US" dirty="0"/>
           </a:p>
@@ -8572,7 +8581,7 @@
           <a:p>
             <a:fld id="{F34E6425-0181-43F2-84FC-787E803FD2F8}" type="datetimeFigureOut">
               <a:rPr lang="en-US" dirty="0"/>
-              <a:t>2/23/2021</a:t>
+              <a:t>3/2/2021</a:t>
             </a:fld>
             <a:endParaRPr lang="en-US" dirty="0"/>
           </a:p>
@@ -8840,7 +8849,7 @@
           <a:p>
             <a:fld id="{3BDB8791-F1B0-41E7-B7FD-A781E65C4266}" type="datetimeFigureOut">
               <a:rPr lang="en-US" dirty="0"/>
-              <a:t>2/23/2021</a:t>
+              <a:t>3/2/2021</a:t>
             </a:fld>
             <a:endParaRPr lang="en-US" dirty="0"/>
           </a:p>
@@ -9246,7 +9255,7 @@
           <a:p>
             <a:fld id="{5FDD63B2-E120-4ED8-B27B-C685F510A5FE}" type="datetimeFigureOut">
               <a:rPr lang="en-US" dirty="0"/>
-              <a:t>2/23/2021</a:t>
+              <a:t>3/2/2021</a:t>
             </a:fld>
             <a:endParaRPr lang="en-US" dirty="0"/>
           </a:p>
@@ -9369,7 +9378,7 @@
           <a:p>
             <a:fld id="{7AA18ACC-A947-437B-A130-35BD54FDF1E9}" type="datetimeFigureOut">
               <a:rPr lang="en-US" dirty="0"/>
-              <a:t>2/23/2021</a:t>
+              <a:t>3/2/2021</a:t>
             </a:fld>
             <a:endParaRPr lang="en-US" dirty="0"/>
           </a:p>
@@ -9460,7 +9469,7 @@
           <a:p>
             <a:fld id="{7C8D7E02-BCB8-4D50-A234-369438C08659}" type="datetimeFigureOut">
               <a:rPr lang="en-US" dirty="0"/>
-              <a:t>2/23/2021</a:t>
+              <a:t>3/2/2021</a:t>
             </a:fld>
             <a:endParaRPr lang="en-US" dirty="0"/>
           </a:p>
@@ -10537,7 +10546,7 @@
           <a:p>
             <a:fld id="{76E86A4C-8E40-4F87-A4F0-01A0687C5742}" type="datetimeFigureOut">
               <a:rPr lang="en-US" dirty="0"/>
-              <a:t>2/23/2021</a:t>
+              <a:t>3/2/2021</a:t>
             </a:fld>
             <a:endParaRPr lang="en-US" dirty="0"/>
           </a:p>
@@ -11641,7 +11650,7 @@
           <a:p>
             <a:fld id="{35E72C73-2D91-4E12-BA25-F0AA0C03599B}" type="datetimeFigureOut">
               <a:rPr lang="en-US" dirty="0"/>
-              <a:t>2/23/2021</a:t>
+              <a:t>3/2/2021</a:t>
             </a:fld>
             <a:endParaRPr lang="en-US" dirty="0"/>
           </a:p>
@@ -12634,7 +12643,7 @@
           <a:p>
             <a:fld id="{2BE451C3-0FF4-47C4-B829-773ADF60F88C}" type="datetimeFigureOut">
               <a:rPr lang="en-US" dirty="0"/>
-              <a:t>2/23/2021</a:t>
+              <a:t>3/2/2021</a:t>
             </a:fld>
             <a:endParaRPr lang="en-US" dirty="0"/>
           </a:p>
@@ -13259,6 +13268,190 @@
 </p:sld>
 </file>
 
+<file path=ppt/slides/slide10.xml><?xml version="1.0" encoding="utf-8"?>
+<p:sld xmlns:a="http://schemas.openxmlformats.org/drawingml/2006/main" xmlns:r="http://schemas.openxmlformats.org/officeDocument/2006/relationships" xmlns:p="http://schemas.openxmlformats.org/presentationml/2006/main">
+  <p:cSld>
+    <p:spTree>
+      <p:nvGrpSpPr>
+        <p:cNvPr id="1" name=""/>
+        <p:cNvGrpSpPr/>
+        <p:nvPr/>
+      </p:nvGrpSpPr>
+      <p:grpSpPr>
+        <a:xfrm>
+          <a:off x="0" y="0"/>
+          <a:ext cx="0" cy="0"/>
+          <a:chOff x="0" y="0"/>
+          <a:chExt cx="0" cy="0"/>
+        </a:xfrm>
+      </p:grpSpPr>
+      <p:sp>
+        <p:nvSpPr>
+          <p:cNvPr id="2" name="Title 1">
+            <a:extLst>
+              <a:ext uri="{FF2B5EF4-FFF2-40B4-BE49-F238E27FC236}">
+                <a16:creationId xmlns:a16="http://schemas.microsoft.com/office/drawing/2014/main" id="{574BAFC1-3E74-423A-99A2-0877CD7C7CB0}"/>
+              </a:ext>
+            </a:extLst>
+          </p:cNvPr>
+          <p:cNvSpPr>
+            <a:spLocks noGrp="1"/>
+          </p:cNvSpPr>
+          <p:nvPr>
+            <p:ph type="title"/>
+          </p:nvPr>
+        </p:nvSpPr>
+        <p:spPr/>
+        <p:txBody>
+          <a:bodyPr/>
+          <a:lstStyle/>
+          <a:p>
+            <a:r>
+              <a:rPr lang="en-GB" dirty="0"/>
+              <a:t>References</a:t>
+            </a:r>
+          </a:p>
+        </p:txBody>
+      </p:sp>
+      <p:sp>
+        <p:nvSpPr>
+          <p:cNvPr id="3" name="Content Placeholder 2">
+            <a:extLst>
+              <a:ext uri="{FF2B5EF4-FFF2-40B4-BE49-F238E27FC236}">
+                <a16:creationId xmlns:a16="http://schemas.microsoft.com/office/drawing/2014/main" id="{8700431E-F30C-4AD9-9913-67AF35C9AF48}"/>
+              </a:ext>
+            </a:extLst>
+          </p:cNvPr>
+          <p:cNvSpPr>
+            <a:spLocks noGrp="1"/>
+          </p:cNvSpPr>
+          <p:nvPr>
+            <p:ph idx="1"/>
+          </p:nvPr>
+        </p:nvSpPr>
+        <p:spPr/>
+        <p:txBody>
+          <a:bodyPr/>
+          <a:lstStyle/>
+          <a:p>
+            <a:r>
+              <a:rPr lang="en-GB" dirty="0"/>
+              <a:t>Turbosquid.com. n.d. </a:t>
+            </a:r>
+            <a:r>
+              <a:rPr lang="en-GB" i="1" dirty="0"/>
+              <a:t>prototyping 2012 3d</a:t>
+            </a:r>
+            <a:r>
+              <a:rPr lang="en-GB" dirty="0"/>
+              <a:t>. [online] Available at: &lt;https://www.turbosquid.com/3d-models/prototyping-2012-3d/702544&gt; [Accessed 20 February 2021].</a:t>
+            </a:r>
+          </a:p>
+          <a:p>
+            <a:r>
+              <a:rPr lang="en-GB" dirty="0"/>
+              <a:t>Turbosquid.com. n.d. </a:t>
+            </a:r>
+            <a:r>
+              <a:rPr lang="en-GB" i="1" dirty="0"/>
+              <a:t>free 3ds model mark v tank</a:t>
+            </a:r>
+            <a:r>
+              <a:rPr lang="en-GB" dirty="0"/>
+              <a:t>. [online] Available at: &lt;https://www.turbosquid.com/3d-models/free-3ds-model-mark-v-tank/525014&gt; [Accessed 2 March 2021].</a:t>
+            </a:r>
+          </a:p>
+          <a:p>
+            <a:r>
+              <a:rPr lang="en-GB" dirty="0" err="1"/>
+              <a:t>Zaal</a:t>
+            </a:r>
+            <a:r>
+              <a:rPr lang="en-GB" dirty="0"/>
+              <a:t>, G., n.d. </a:t>
+            </a:r>
+            <a:r>
+              <a:rPr lang="en-GB" i="1" dirty="0"/>
+              <a:t>HDRI: Kiara 7 Late-Afternoon | HDRI Haven</a:t>
+            </a:r>
+            <a:r>
+              <a:rPr lang="en-GB" dirty="0"/>
+              <a:t>. [online] HDRI Haven. Available at: &lt;https://hdrihaven.com/hdri/?c=skies&amp;h=kiara_7_late-afternoon&gt; [Accessed 2 March 2021].</a:t>
+            </a:r>
+          </a:p>
+        </p:txBody>
+      </p:sp>
+    </p:spTree>
+    <p:extLst>
+      <p:ext uri="{BB962C8B-B14F-4D97-AF65-F5344CB8AC3E}">
+        <p14:creationId xmlns:p14="http://schemas.microsoft.com/office/powerpoint/2010/main" val="194403221"/>
+      </p:ext>
+    </p:extLst>
+  </p:cSld>
+  <p:clrMapOvr>
+    <a:masterClrMapping/>
+  </p:clrMapOvr>
+</p:sld>
+</file>
+
+<file path=ppt/slides/slide11.xml><?xml version="1.0" encoding="utf-8"?>
+<p:sld xmlns:a="http://schemas.openxmlformats.org/drawingml/2006/main" xmlns:r="http://schemas.openxmlformats.org/officeDocument/2006/relationships" xmlns:p="http://schemas.openxmlformats.org/presentationml/2006/main">
+  <p:cSld>
+    <p:spTree>
+      <p:nvGrpSpPr>
+        <p:cNvPr id="1" name=""/>
+        <p:cNvGrpSpPr/>
+        <p:nvPr/>
+      </p:nvGrpSpPr>
+      <p:grpSpPr>
+        <a:xfrm>
+          <a:off x="0" y="0"/>
+          <a:ext cx="0" cy="0"/>
+          <a:chOff x="0" y="0"/>
+          <a:chExt cx="0" cy="0"/>
+        </a:xfrm>
+      </p:grpSpPr>
+      <p:sp>
+        <p:nvSpPr>
+          <p:cNvPr id="2" name="Title 1">
+            <a:extLst>
+              <a:ext uri="{FF2B5EF4-FFF2-40B4-BE49-F238E27FC236}">
+                <a16:creationId xmlns:a16="http://schemas.microsoft.com/office/drawing/2014/main" id="{82891364-7710-43CD-ACEA-07C0133C5488}"/>
+              </a:ext>
+            </a:extLst>
+          </p:cNvPr>
+          <p:cNvSpPr>
+            <a:spLocks noGrp="1"/>
+          </p:cNvSpPr>
+          <p:nvPr>
+            <p:ph type="title"/>
+          </p:nvPr>
+        </p:nvSpPr>
+        <p:spPr/>
+        <p:txBody>
+          <a:bodyPr/>
+          <a:lstStyle/>
+          <a:p>
+            <a:r>
+              <a:rPr lang="en-GB" dirty="0"/>
+              <a:t>Demo / Questions</a:t>
+            </a:r>
+          </a:p>
+        </p:txBody>
+      </p:sp>
+    </p:spTree>
+    <p:extLst>
+      <p:ext uri="{BB962C8B-B14F-4D97-AF65-F5344CB8AC3E}">
+        <p14:creationId xmlns:p14="http://schemas.microsoft.com/office/powerpoint/2010/main" val="3220852631"/>
+      </p:ext>
+    </p:extLst>
+  </p:cSld>
+  <p:clrMapOvr>
+    <a:masterClrMapping/>
+  </p:clrMapOvr>
+</p:sld>
+</file>
+
 <file path=ppt/slides/slide2.xml><?xml version="1.0" encoding="utf-8"?>
 <p:sld xmlns:a="http://schemas.openxmlformats.org/drawingml/2006/main" xmlns:r="http://schemas.openxmlformats.org/officeDocument/2006/relationships" xmlns:p="http://schemas.openxmlformats.org/presentationml/2006/main">
   <p:cSld>
@@ -13468,7 +13661,7 @@
           <p:nvPr>
             <p:extLst>
               <p:ext uri="{D42A27DB-BD31-4B8C-83A1-F6EECF244321}">
-                <p14:modId xmlns:p14="http://schemas.microsoft.com/office/powerpoint/2010/main" val="3414909390"/>
+                <p14:modId xmlns:p14="http://schemas.microsoft.com/office/powerpoint/2010/main" val="3201577224"/>
               </p:ext>
             </p:extLst>
           </p:nvPr>
@@ -14075,11 +14268,16 @@
                       <a:r>
                         <a:rPr lang="en-GB" b="1" dirty="0">
                           <a:solidFill>
-                            <a:srgbClr val="FF0000"/>
+                            <a:srgbClr val="57C97A"/>
                           </a:solidFill>
                         </a:rPr>
-                        <a:t>No</a:t>
+                        <a:t>Yes</a:t>
                       </a:r>
+                      <a:endParaRPr lang="en-GB" b="1" dirty="0">
+                        <a:solidFill>
+                          <a:srgbClr val="FF0000"/>
+                        </a:solidFill>
+                      </a:endParaRPr>
                     </a:p>
                   </a:txBody>
                   <a:tcPr/>
@@ -14926,6 +15124,410 @@
           <p:cNvPr id="2" name="Title 1">
             <a:extLst>
               <a:ext uri="{FF2B5EF4-FFF2-40B4-BE49-F238E27FC236}">
+                <a16:creationId xmlns:a16="http://schemas.microsoft.com/office/drawing/2014/main" id="{2801AEF4-6758-4AFC-9552-A1D15ADBB26B}"/>
+              </a:ext>
+            </a:extLst>
+          </p:cNvPr>
+          <p:cNvSpPr>
+            <a:spLocks noGrp="1"/>
+          </p:cNvSpPr>
+          <p:nvPr>
+            <p:ph type="title"/>
+          </p:nvPr>
+        </p:nvSpPr>
+        <p:spPr/>
+        <p:txBody>
+          <a:bodyPr/>
+          <a:lstStyle/>
+          <a:p>
+            <a:r>
+              <a:rPr lang="en-GB" dirty="0"/>
+              <a:t>Skybox vs </a:t>
+            </a:r>
+            <a:r>
+              <a:rPr lang="en-GB" dirty="0" err="1"/>
+              <a:t>Skydome</a:t>
+            </a:r>
+            <a:endParaRPr lang="en-GB" dirty="0"/>
+          </a:p>
+        </p:txBody>
+      </p:sp>
+      <p:graphicFrame>
+        <p:nvGraphicFramePr>
+          <p:cNvPr id="4" name="Table 4">
+            <a:extLst>
+              <a:ext uri="{FF2B5EF4-FFF2-40B4-BE49-F238E27FC236}">
+                <a16:creationId xmlns:a16="http://schemas.microsoft.com/office/drawing/2014/main" id="{79E08E3E-30D3-42F0-A47F-FE0471BDFC71}"/>
+              </a:ext>
+            </a:extLst>
+          </p:cNvPr>
+          <p:cNvGraphicFramePr>
+            <a:graphicFrameLocks noGrp="1"/>
+          </p:cNvGraphicFramePr>
+          <p:nvPr>
+            <p:extLst>
+              <p:ext uri="{D42A27DB-BD31-4B8C-83A1-F6EECF244321}">
+                <p14:modId xmlns:p14="http://schemas.microsoft.com/office/powerpoint/2010/main" val="2195631183"/>
+              </p:ext>
+            </p:extLst>
+          </p:nvPr>
+        </p:nvGraphicFramePr>
+        <p:xfrm>
+          <a:off x="2032000" y="2397357"/>
+          <a:ext cx="8128000" cy="2667000"/>
+        </p:xfrm>
+        <a:graphic>
+          <a:graphicData uri="http://schemas.openxmlformats.org/drawingml/2006/table">
+            <a:tbl>
+              <a:tblPr firstRow="1" bandRow="1">
+                <a:tableStyleId>{5C22544A-7EE6-4342-B048-85BDC9FD1C3A}</a:tableStyleId>
+              </a:tblPr>
+              <a:tblGrid>
+                <a:gridCol w="4064000">
+                  <a:extLst>
+                    <a:ext uri="{9D8B030D-6E8A-4147-A177-3AD203B41FA5}">
+                      <a16:colId xmlns:a16="http://schemas.microsoft.com/office/drawing/2014/main" val="613652004"/>
+                    </a:ext>
+                  </a:extLst>
+                </a:gridCol>
+                <a:gridCol w="4064000">
+                  <a:extLst>
+                    <a:ext uri="{9D8B030D-6E8A-4147-A177-3AD203B41FA5}">
+                      <a16:colId xmlns:a16="http://schemas.microsoft.com/office/drawing/2014/main" val="1327011848"/>
+                    </a:ext>
+                  </a:extLst>
+                </a:gridCol>
+              </a:tblGrid>
+              <a:tr h="370840">
+                <a:tc>
+                  <a:txBody>
+                    <a:bodyPr/>
+                    <a:lstStyle/>
+                    <a:p>
+                      <a:r>
+                        <a:rPr lang="en-GB" dirty="0"/>
+                        <a:t>Reasons for Skybox</a:t>
+                      </a:r>
+                    </a:p>
+                  </a:txBody>
+                  <a:tcPr/>
+                </a:tc>
+                <a:tc>
+                  <a:txBody>
+                    <a:bodyPr/>
+                    <a:lstStyle/>
+                    <a:p>
+                      <a:r>
+                        <a:rPr lang="en-GB" dirty="0"/>
+                        <a:t>Reasons for </a:t>
+                      </a:r>
+                      <a:r>
+                        <a:rPr lang="en-GB" dirty="0" err="1"/>
+                        <a:t>skydome</a:t>
+                      </a:r>
+                      <a:endParaRPr lang="en-GB" dirty="0"/>
+                    </a:p>
+                  </a:txBody>
+                  <a:tcPr/>
+                </a:tc>
+                <a:extLst>
+                  <a:ext uri="{0D108BD9-81ED-4DB2-BD59-A6C34878D82A}">
+                    <a16:rowId xmlns:a16="http://schemas.microsoft.com/office/drawing/2014/main" val="1616531049"/>
+                  </a:ext>
+                </a:extLst>
+              </a:tr>
+              <a:tr h="370840">
+                <a:tc>
+                  <a:txBody>
+                    <a:bodyPr/>
+                    <a:lstStyle/>
+                    <a:p>
+                      <a:r>
+                        <a:rPr lang="en-GB" dirty="0"/>
+                        <a:t>Easier to implement</a:t>
+                      </a:r>
+                    </a:p>
+                  </a:txBody>
+                  <a:tcPr/>
+                </a:tc>
+                <a:tc>
+                  <a:txBody>
+                    <a:bodyPr/>
+                    <a:lstStyle/>
+                    <a:p>
+                      <a:r>
+                        <a:rPr lang="en-GB" dirty="0"/>
+                        <a:t>Less chance of seams</a:t>
+                      </a:r>
+                    </a:p>
+                  </a:txBody>
+                  <a:tcPr/>
+                </a:tc>
+                <a:extLst>
+                  <a:ext uri="{0D108BD9-81ED-4DB2-BD59-A6C34878D82A}">
+                    <a16:rowId xmlns:a16="http://schemas.microsoft.com/office/drawing/2014/main" val="4146610183"/>
+                  </a:ext>
+                </a:extLst>
+              </a:tr>
+              <a:tr h="370840">
+                <a:tc>
+                  <a:txBody>
+                    <a:bodyPr/>
+                    <a:lstStyle/>
+                    <a:p>
+                      <a:r>
+                        <a:rPr lang="en-GB" dirty="0"/>
+                        <a:t>Requires less vertices</a:t>
+                      </a:r>
+                    </a:p>
+                  </a:txBody>
+                  <a:tcPr/>
+                </a:tc>
+                <a:tc>
+                  <a:txBody>
+                    <a:bodyPr/>
+                    <a:lstStyle/>
+                    <a:p>
+                      <a:r>
+                        <a:rPr lang="en-GB" dirty="0"/>
+                        <a:t>Less chance of warped perspective (compared to skybox)</a:t>
+                      </a:r>
+                    </a:p>
+                  </a:txBody>
+                  <a:tcPr/>
+                </a:tc>
+                <a:extLst>
+                  <a:ext uri="{0D108BD9-81ED-4DB2-BD59-A6C34878D82A}">
+                    <a16:rowId xmlns:a16="http://schemas.microsoft.com/office/drawing/2014/main" val="3310380977"/>
+                  </a:ext>
+                </a:extLst>
+              </a:tr>
+              <a:tr h="370840">
+                <a:tc>
+                  <a:txBody>
+                    <a:bodyPr/>
+                    <a:lstStyle/>
+                    <a:p>
+                      <a:r>
+                        <a:rPr lang="en-GB" dirty="0"/>
+                        <a:t>Faster to draw</a:t>
+                      </a:r>
+                    </a:p>
+                  </a:txBody>
+                  <a:tcPr/>
+                </a:tc>
+                <a:tc>
+                  <a:txBody>
+                    <a:bodyPr/>
+                    <a:lstStyle/>
+                    <a:p>
+                      <a:r>
+                        <a:rPr lang="en-GB" dirty="0"/>
+                        <a:t>More flexible for various resolutions</a:t>
+                      </a:r>
+                    </a:p>
+                  </a:txBody>
+                  <a:tcPr/>
+                </a:tc>
+                <a:extLst>
+                  <a:ext uri="{0D108BD9-81ED-4DB2-BD59-A6C34878D82A}">
+                    <a16:rowId xmlns:a16="http://schemas.microsoft.com/office/drawing/2014/main" val="2916002432"/>
+                  </a:ext>
+                </a:extLst>
+              </a:tr>
+              <a:tr h="370840">
+                <a:tc>
+                  <a:txBody>
+                    <a:bodyPr/>
+                    <a:lstStyle/>
+                    <a:p>
+                      <a:endParaRPr lang="en-GB" dirty="0"/>
+                    </a:p>
+                  </a:txBody>
+                  <a:tcPr/>
+                </a:tc>
+                <a:tc>
+                  <a:txBody>
+                    <a:bodyPr/>
+                    <a:lstStyle/>
+                    <a:p>
+                      <a:r>
+                        <a:rPr lang="en-GB" dirty="0"/>
+                        <a:t>Can use HDRI image that can encode more data about how the image is lit</a:t>
+                      </a:r>
+                    </a:p>
+                  </a:txBody>
+                  <a:tcPr/>
+                </a:tc>
+                <a:extLst>
+                  <a:ext uri="{0D108BD9-81ED-4DB2-BD59-A6C34878D82A}">
+                    <a16:rowId xmlns:a16="http://schemas.microsoft.com/office/drawing/2014/main" val="2062537840"/>
+                  </a:ext>
+                </a:extLst>
+              </a:tr>
+            </a:tbl>
+          </a:graphicData>
+        </a:graphic>
+      </p:graphicFrame>
+      <p:sp>
+        <p:nvSpPr>
+          <p:cNvPr id="5" name="Rectangle 4">
+            <a:extLst>
+              <a:ext uri="{FF2B5EF4-FFF2-40B4-BE49-F238E27FC236}">
+                <a16:creationId xmlns:a16="http://schemas.microsoft.com/office/drawing/2014/main" id="{7382AFE6-579C-4C0D-A6F6-D6D4AE9392F3}"/>
+              </a:ext>
+            </a:extLst>
+          </p:cNvPr>
+          <p:cNvSpPr/>
+          <p:nvPr/>
+        </p:nvSpPr>
+        <p:spPr>
+          <a:xfrm>
+            <a:off x="2032000" y="5097368"/>
+            <a:ext cx="8128000" cy="369332"/>
+          </a:xfrm>
+          <a:prstGeom prst="rect">
+            <a:avLst/>
+          </a:prstGeom>
+        </p:spPr>
+        <p:txBody>
+          <a:bodyPr wrap="square">
+            <a:spAutoFit/>
+          </a:bodyPr>
+          <a:lstStyle/>
+          <a:p>
+            <a:r>
+              <a:rPr lang="en-GB" dirty="0"/>
+              <a:t>Table 3: List of reasons for either skybox or </a:t>
+            </a:r>
+            <a:r>
+              <a:rPr lang="en-GB" dirty="0" err="1"/>
+              <a:t>skydomes</a:t>
+            </a:r>
+            <a:endParaRPr lang="en-GB" dirty="0"/>
+          </a:p>
+        </p:txBody>
+      </p:sp>
+      <p:sp>
+        <p:nvSpPr>
+          <p:cNvPr id="6" name="Content Placeholder 2">
+            <a:extLst>
+              <a:ext uri="{FF2B5EF4-FFF2-40B4-BE49-F238E27FC236}">
+                <a16:creationId xmlns:a16="http://schemas.microsoft.com/office/drawing/2014/main" id="{F0415C43-60BC-453E-B11B-3ECCBD5C4D6B}"/>
+              </a:ext>
+            </a:extLst>
+          </p:cNvPr>
+          <p:cNvSpPr>
+            <a:spLocks noGrp="1"/>
+          </p:cNvSpPr>
+          <p:nvPr>
+            <p:ph idx="1"/>
+          </p:nvPr>
+        </p:nvSpPr>
+        <p:spPr>
+          <a:xfrm>
+            <a:off x="505847" y="5499710"/>
+            <a:ext cx="11180306" cy="1238177"/>
+          </a:xfrm>
+        </p:spPr>
+        <p:txBody>
+          <a:bodyPr/>
+          <a:lstStyle/>
+          <a:p>
+            <a:r>
+              <a:rPr lang="en-GB" dirty="0"/>
+              <a:t>The idea for the project is to </a:t>
+            </a:r>
+            <a:r>
+              <a:rPr lang="en-GB" b="1" dirty="0"/>
+              <a:t>try to implement a </a:t>
+            </a:r>
+            <a:r>
+              <a:rPr lang="en-GB" b="1" dirty="0" err="1"/>
+              <a:t>skydome</a:t>
+            </a:r>
+            <a:r>
+              <a:rPr lang="en-GB" b="1" dirty="0"/>
+              <a:t> </a:t>
+            </a:r>
+            <a:r>
+              <a:rPr lang="en-GB" dirty="0"/>
+              <a:t>and </a:t>
+            </a:r>
+            <a:r>
+              <a:rPr lang="en-GB" b="1" dirty="0"/>
+              <a:t>test it on a low end system </a:t>
+            </a:r>
+            <a:r>
+              <a:rPr lang="en-GB" dirty="0"/>
+              <a:t>once the other features are implemented </a:t>
+            </a:r>
+            <a:r>
+              <a:rPr lang="en-GB" b="1" dirty="0"/>
+              <a:t>and if frame rates are within acceptable parameters</a:t>
+            </a:r>
+            <a:r>
+              <a:rPr lang="en-GB" dirty="0"/>
+              <a:t> it can be </a:t>
+            </a:r>
+            <a:r>
+              <a:rPr lang="en-GB" b="1" dirty="0"/>
+              <a:t>used as the permanent solution</a:t>
+            </a:r>
+            <a:r>
+              <a:rPr lang="en-GB" dirty="0"/>
+              <a:t>, </a:t>
+            </a:r>
+            <a:r>
+              <a:rPr lang="en-GB" b="1" dirty="0"/>
+              <a:t>if not then a skybox will be used</a:t>
+            </a:r>
+            <a:r>
+              <a:rPr lang="en-GB" dirty="0"/>
+              <a:t>, as a personal aspiration of the project is to </a:t>
+            </a:r>
+            <a:r>
+              <a:rPr lang="en-GB" b="1" dirty="0"/>
+              <a:t>get the engine running on low end systems with high performance</a:t>
+            </a:r>
+          </a:p>
+        </p:txBody>
+      </p:sp>
+    </p:spTree>
+    <p:extLst>
+      <p:ext uri="{BB962C8B-B14F-4D97-AF65-F5344CB8AC3E}">
+        <p14:creationId xmlns:p14="http://schemas.microsoft.com/office/powerpoint/2010/main" val="1503834415"/>
+      </p:ext>
+    </p:extLst>
+  </p:cSld>
+  <p:clrMapOvr>
+    <a:masterClrMapping/>
+  </p:clrMapOvr>
+</p:sld>
+</file>
+
+<file path=ppt/slides/slide7.xml><?xml version="1.0" encoding="utf-8"?>
+<p:sld xmlns:a="http://schemas.openxmlformats.org/drawingml/2006/main" xmlns:r="http://schemas.openxmlformats.org/officeDocument/2006/relationships" xmlns:p="http://schemas.openxmlformats.org/presentationml/2006/main">
+  <p:cSld>
+    <p:spTree>
+      <p:nvGrpSpPr>
+        <p:cNvPr id="1" name=""/>
+        <p:cNvGrpSpPr/>
+        <p:nvPr/>
+      </p:nvGrpSpPr>
+      <p:grpSpPr>
+        <a:xfrm>
+          <a:off x="0" y="0"/>
+          <a:ext cx="0" cy="0"/>
+          <a:chOff x="0" y="0"/>
+          <a:chExt cx="0" cy="0"/>
+        </a:xfrm>
+      </p:grpSpPr>
+      <p:sp>
+        <p:nvSpPr>
+          <p:cNvPr id="2" name="Title 1">
+            <a:extLst>
+              <a:ext uri="{FF2B5EF4-FFF2-40B4-BE49-F238E27FC236}">
                 <a16:creationId xmlns:a16="http://schemas.microsoft.com/office/drawing/2014/main" id="{A8837C49-E7EE-430D-899D-917699A3F5CD}"/>
               </a:ext>
             </a:extLst>
@@ -14951,34 +15553,69 @@
       </p:sp>
       <p:sp>
         <p:nvSpPr>
-          <p:cNvPr id="3" name="Content Placeholder 2">
+          <p:cNvPr id="5" name="TextBox 4">
             <a:extLst>
               <a:ext uri="{FF2B5EF4-FFF2-40B4-BE49-F238E27FC236}">
-                <a16:creationId xmlns:a16="http://schemas.microsoft.com/office/drawing/2014/main" id="{6990042A-0F2C-4022-A846-B7B96C1D47F3}"/>
+                <a16:creationId xmlns:a16="http://schemas.microsoft.com/office/drawing/2014/main" id="{158984CD-05EC-40E0-8340-1CC2FAEDE59E}"/>
               </a:ext>
             </a:extLst>
           </p:cNvPr>
-          <p:cNvSpPr>
-            <a:spLocks noGrp="1"/>
-          </p:cNvSpPr>
-          <p:nvPr>
-            <p:ph idx="1"/>
-          </p:nvPr>
+          <p:cNvSpPr txBox="1"/>
+          <p:nvPr/>
         </p:nvSpPr>
         <p:spPr>
           <a:xfrm>
-            <a:off x="1154954" y="4993640"/>
-            <a:ext cx="8825659" cy="1026160"/>
+            <a:off x="3664228" y="6392573"/>
+            <a:ext cx="4863544" cy="369332"/>
           </a:xfrm>
+          <a:prstGeom prst="rect">
+            <a:avLst/>
+          </a:prstGeom>
+          <a:noFill/>
         </p:spPr>
         <p:txBody>
-          <a:bodyPr/>
+          <a:bodyPr wrap="square" rtlCol="0">
+            <a:spAutoFit/>
+          </a:bodyPr>
           <a:lstStyle/>
           <a:p>
-            <a:endParaRPr lang="en-GB" dirty="0"/>
+            <a:r>
+              <a:rPr lang="en-GB" dirty="0"/>
+              <a:t>Figure 2: A screenshot of the game scene</a:t>
+            </a:r>
           </a:p>
         </p:txBody>
       </p:sp>
+      <p:pic>
+        <p:nvPicPr>
+          <p:cNvPr id="7" name="Picture 6">
+            <a:extLst>
+              <a:ext uri="{FF2B5EF4-FFF2-40B4-BE49-F238E27FC236}">
+                <a16:creationId xmlns:a16="http://schemas.microsoft.com/office/drawing/2014/main" id="{9C0F7B6B-A1B5-4A84-8389-FFC30B5FD923}"/>
+              </a:ext>
+            </a:extLst>
+          </p:cNvPr>
+          <p:cNvPicPr>
+            <a:picLocks noChangeAspect="1"/>
+          </p:cNvPicPr>
+          <p:nvPr/>
+        </p:nvPicPr>
+        <p:blipFill>
+          <a:blip r:embed="rId2"/>
+          <a:stretch>
+            <a:fillRect/>
+          </a:stretch>
+        </p:blipFill>
+        <p:spPr>
+          <a:xfrm>
+            <a:off x="2464960" y="2315949"/>
+            <a:ext cx="7262079" cy="4076624"/>
+          </a:xfrm>
+          <a:prstGeom prst="rect">
+            <a:avLst/>
+          </a:prstGeom>
+        </p:spPr>
+      </p:pic>
     </p:spTree>
     <p:extLst>
       <p:ext uri="{BB962C8B-B14F-4D97-AF65-F5344CB8AC3E}">
@@ -14992,7 +15629,7 @@
 </p:sld>
 </file>
 
-<file path=ppt/slides/slide7.xml><?xml version="1.0" encoding="utf-8"?>
+<file path=ppt/slides/slide8.xml><?xml version="1.0" encoding="utf-8"?>
 <p:sld xmlns:a="http://schemas.openxmlformats.org/drawingml/2006/main" xmlns:r="http://schemas.openxmlformats.org/officeDocument/2006/relationships" xmlns:p="http://schemas.openxmlformats.org/presentationml/2006/main">
   <p:cSld>
     <p:spTree>
@@ -15039,10 +15676,298 @@
       </p:sp>
       <p:sp>
         <p:nvSpPr>
+          <p:cNvPr id="4" name="TextBox 3">
+            <a:extLst>
+              <a:ext uri="{FF2B5EF4-FFF2-40B4-BE49-F238E27FC236}">
+                <a16:creationId xmlns:a16="http://schemas.microsoft.com/office/drawing/2014/main" id="{AFBD79FB-1DB0-431A-BDD7-1D90AD92C27C}"/>
+              </a:ext>
+            </a:extLst>
+          </p:cNvPr>
+          <p:cNvSpPr txBox="1"/>
+          <p:nvPr/>
+        </p:nvSpPr>
+        <p:spPr>
+          <a:xfrm>
+            <a:off x="551911" y="5928360"/>
+            <a:ext cx="11180306" cy="369332"/>
+          </a:xfrm>
+          <a:prstGeom prst="rect">
+            <a:avLst/>
+          </a:prstGeom>
+          <a:noFill/>
+        </p:spPr>
+        <p:txBody>
+          <a:bodyPr wrap="square" rtlCol="0">
+            <a:spAutoFit/>
+          </a:bodyPr>
+          <a:lstStyle/>
+          <a:p>
+            <a:r>
+              <a:rPr lang="en-GB" dirty="0"/>
+              <a:t>Table 2: A table of performance metrics with varying scene complexity and computational steps</a:t>
+            </a:r>
+          </a:p>
+        </p:txBody>
+      </p:sp>
+      <p:graphicFrame>
+        <p:nvGraphicFramePr>
+          <p:cNvPr id="5" name="Table 5">
+            <a:extLst>
+              <a:ext uri="{FF2B5EF4-FFF2-40B4-BE49-F238E27FC236}">
+                <a16:creationId xmlns:a16="http://schemas.microsoft.com/office/drawing/2014/main" id="{724C1494-EEE6-4AA7-8BDF-7E2343E99ECA}"/>
+              </a:ext>
+            </a:extLst>
+          </p:cNvPr>
+          <p:cNvGraphicFramePr>
+            <a:graphicFrameLocks noGrp="1"/>
+          </p:cNvGraphicFramePr>
+          <p:nvPr>
+            <p:extLst>
+              <p:ext uri="{D42A27DB-BD31-4B8C-83A1-F6EECF244321}">
+                <p14:modId xmlns:p14="http://schemas.microsoft.com/office/powerpoint/2010/main" val="398121509"/>
+              </p:ext>
+            </p:extLst>
+          </p:nvPr>
+        </p:nvGraphicFramePr>
+        <p:xfrm>
+          <a:off x="551911" y="2591087"/>
+          <a:ext cx="11180304" cy="1925320"/>
+        </p:xfrm>
+        <a:graphic>
+          <a:graphicData uri="http://schemas.openxmlformats.org/drawingml/2006/table">
+            <a:tbl>
+              <a:tblPr firstRow="1" bandRow="1">
+                <a:tableStyleId>{5C22544A-7EE6-4342-B048-85BDC9FD1C3A}</a:tableStyleId>
+              </a:tblPr>
+              <a:tblGrid>
+                <a:gridCol w="3726768">
+                  <a:extLst>
+                    <a:ext uri="{9D8B030D-6E8A-4147-A177-3AD203B41FA5}">
+                      <a16:colId xmlns:a16="http://schemas.microsoft.com/office/drawing/2014/main" val="1530269342"/>
+                    </a:ext>
+                  </a:extLst>
+                </a:gridCol>
+                <a:gridCol w="3726768">
+                  <a:extLst>
+                    <a:ext uri="{9D8B030D-6E8A-4147-A177-3AD203B41FA5}">
+                      <a16:colId xmlns:a16="http://schemas.microsoft.com/office/drawing/2014/main" val="1929180689"/>
+                    </a:ext>
+                  </a:extLst>
+                </a:gridCol>
+                <a:gridCol w="3726768">
+                  <a:extLst>
+                    <a:ext uri="{9D8B030D-6E8A-4147-A177-3AD203B41FA5}">
+                      <a16:colId xmlns:a16="http://schemas.microsoft.com/office/drawing/2014/main" val="2054553233"/>
+                    </a:ext>
+                  </a:extLst>
+                </a:gridCol>
+              </a:tblGrid>
+              <a:tr h="370840">
+                <a:tc>
+                  <a:txBody>
+                    <a:bodyPr/>
+                    <a:lstStyle/>
+                    <a:p>
+                      <a:r>
+                        <a:rPr lang="en-GB" dirty="0"/>
+                        <a:t>Scene description</a:t>
+                      </a:r>
+                    </a:p>
+                  </a:txBody>
+                  <a:tcPr/>
+                </a:tc>
+                <a:tc>
+                  <a:txBody>
+                    <a:bodyPr/>
+                    <a:lstStyle/>
+                    <a:p>
+                      <a:r>
+                        <a:rPr lang="en-GB" dirty="0"/>
+                        <a:t>Number of draw calls</a:t>
+                      </a:r>
+                    </a:p>
+                  </a:txBody>
+                  <a:tcPr/>
+                </a:tc>
+                <a:tc>
+                  <a:txBody>
+                    <a:bodyPr/>
+                    <a:lstStyle/>
+                    <a:p>
+                      <a:r>
+                        <a:rPr lang="en-GB" dirty="0"/>
+                        <a:t>Average estimated FPS</a:t>
+                      </a:r>
+                    </a:p>
+                  </a:txBody>
+                  <a:tcPr/>
+                </a:tc>
+                <a:extLst>
+                  <a:ext uri="{0D108BD9-81ED-4DB2-BD59-A6C34878D82A}">
+                    <a16:rowId xmlns:a16="http://schemas.microsoft.com/office/drawing/2014/main" val="1665322479"/>
+                  </a:ext>
+                </a:extLst>
+              </a:tr>
+              <a:tr h="370840">
+                <a:tc>
+                  <a:txBody>
+                    <a:bodyPr/>
+                    <a:lstStyle/>
+                    <a:p>
+                      <a:r>
+                        <a:rPr lang="en-GB" dirty="0"/>
+                        <a:t>A spinning monkey with no texture (uses vertex colours)</a:t>
+                      </a:r>
+                    </a:p>
+                  </a:txBody>
+                  <a:tcPr/>
+                </a:tc>
+                <a:tc>
+                  <a:txBody>
+                    <a:bodyPr/>
+                    <a:lstStyle/>
+                    <a:p>
+                      <a:r>
+                        <a:rPr lang="en-GB" dirty="0"/>
+                        <a:t>1</a:t>
+                      </a:r>
+                    </a:p>
+                  </a:txBody>
+                  <a:tcPr/>
+                </a:tc>
+                <a:tc>
+                  <a:txBody>
+                    <a:bodyPr/>
+                    <a:lstStyle/>
+                    <a:p>
+                      <a:r>
+                        <a:rPr lang="en-GB" dirty="0"/>
+                        <a:t>3381 FPS</a:t>
+                      </a:r>
+                    </a:p>
+                  </a:txBody>
+                  <a:tcPr/>
+                </a:tc>
+                <a:extLst>
+                  <a:ext uri="{0D108BD9-81ED-4DB2-BD59-A6C34878D82A}">
+                    <a16:rowId xmlns:a16="http://schemas.microsoft.com/office/drawing/2014/main" val="3730468979"/>
+                  </a:ext>
+                </a:extLst>
+              </a:tr>
+              <a:tr h="370840">
+                <a:tc>
+                  <a:txBody>
+                    <a:bodyPr/>
+                    <a:lstStyle/>
+                    <a:p>
+                      <a:r>
+                        <a:rPr lang="en-GB" dirty="0"/>
+                        <a:t>A basic scene with textured houses, ground plane, tanks and a skybox</a:t>
+                      </a:r>
+                    </a:p>
+                  </a:txBody>
+                  <a:tcPr/>
+                </a:tc>
+                <a:tc>
+                  <a:txBody>
+                    <a:bodyPr/>
+                    <a:lstStyle/>
+                    <a:p>
+                      <a:r>
+                        <a:rPr lang="en-GB" dirty="0"/>
+                        <a:t>7</a:t>
+                      </a:r>
+                    </a:p>
+                  </a:txBody>
+                  <a:tcPr/>
+                </a:tc>
+                <a:tc>
+                  <a:txBody>
+                    <a:bodyPr/>
+                    <a:lstStyle/>
+                    <a:p>
+                      <a:r>
+                        <a:rPr lang="en-GB" dirty="0"/>
+                        <a:t>2051 FPS</a:t>
+                      </a:r>
+                    </a:p>
+                  </a:txBody>
+                  <a:tcPr/>
+                </a:tc>
+                <a:extLst>
+                  <a:ext uri="{0D108BD9-81ED-4DB2-BD59-A6C34878D82A}">
+                    <a16:rowId xmlns:a16="http://schemas.microsoft.com/office/drawing/2014/main" val="75549984"/>
+                  </a:ext>
+                </a:extLst>
+              </a:tr>
+            </a:tbl>
+          </a:graphicData>
+        </a:graphic>
+      </p:graphicFrame>
+    </p:spTree>
+    <p:extLst>
+      <p:ext uri="{BB962C8B-B14F-4D97-AF65-F5344CB8AC3E}">
+        <p14:creationId xmlns:p14="http://schemas.microsoft.com/office/powerpoint/2010/main" val="1020114105"/>
+      </p:ext>
+    </p:extLst>
+  </p:cSld>
+  <p:clrMapOvr>
+    <a:masterClrMapping/>
+  </p:clrMapOvr>
+</p:sld>
+</file>
+
+<file path=ppt/slides/slide9.xml><?xml version="1.0" encoding="utf-8"?>
+<p:sld xmlns:a="http://schemas.openxmlformats.org/drawingml/2006/main" xmlns:r="http://schemas.openxmlformats.org/officeDocument/2006/relationships" xmlns:p="http://schemas.openxmlformats.org/presentationml/2006/main">
+  <p:cSld>
+    <p:spTree>
+      <p:nvGrpSpPr>
+        <p:cNvPr id="1" name=""/>
+        <p:cNvGrpSpPr/>
+        <p:nvPr/>
+      </p:nvGrpSpPr>
+      <p:grpSpPr>
+        <a:xfrm>
+          <a:off x="0" y="0"/>
+          <a:ext cx="0" cy="0"/>
+          <a:chOff x="0" y="0"/>
+          <a:chExt cx="0" cy="0"/>
+        </a:xfrm>
+      </p:grpSpPr>
+      <p:sp>
+        <p:nvSpPr>
+          <p:cNvPr id="2" name="Title 1">
+            <a:extLst>
+              <a:ext uri="{FF2B5EF4-FFF2-40B4-BE49-F238E27FC236}">
+                <a16:creationId xmlns:a16="http://schemas.microsoft.com/office/drawing/2014/main" id="{9BDF4F6B-3D33-4B09-BD2C-6D3B19A084C6}"/>
+              </a:ext>
+            </a:extLst>
+          </p:cNvPr>
+          <p:cNvSpPr>
+            <a:spLocks noGrp="1"/>
+          </p:cNvSpPr>
+          <p:nvPr>
+            <p:ph type="title"/>
+          </p:nvPr>
+        </p:nvSpPr>
+        <p:spPr/>
+        <p:txBody>
+          <a:bodyPr/>
+          <a:lstStyle/>
+          <a:p>
+            <a:r>
+              <a:rPr lang="en-GB" dirty="0"/>
+              <a:t>Issues/Areas to be improved</a:t>
+            </a:r>
+          </a:p>
+        </p:txBody>
+      </p:sp>
+      <p:sp>
+        <p:nvSpPr>
           <p:cNvPr id="3" name="Content Placeholder 2">
             <a:extLst>
               <a:ext uri="{FF2B5EF4-FFF2-40B4-BE49-F238E27FC236}">
-                <a16:creationId xmlns:a16="http://schemas.microsoft.com/office/drawing/2014/main" id="{93722009-42D2-49D3-8326-86F826CD9792}"/>
+                <a16:creationId xmlns:a16="http://schemas.microsoft.com/office/drawing/2014/main" id="{07EA6CAF-C4D5-4F16-8F1D-7245B28B37AD}"/>
               </a:ext>
             </a:extLst>
           </p:cNvPr>
@@ -15053,19 +15978,93 @@
             <p:ph idx="1"/>
           </p:nvPr>
         </p:nvSpPr>
-        <p:spPr/>
+        <p:spPr>
+          <a:xfrm>
+            <a:off x="1154954" y="2313122"/>
+            <a:ext cx="8825659" cy="4126424"/>
+          </a:xfrm>
+        </p:spPr>
         <p:txBody>
           <a:bodyPr/>
           <a:lstStyle/>
           <a:p>
-            <a:endParaRPr lang="en-GB" dirty="0"/>
+            <a:r>
+              <a:rPr lang="en-GB" dirty="0"/>
+              <a:t>Currently For each model being rendered to screen there either needs to be a separate model Renderer or the models need to be merged together in software like blender and then exported as a unique wavefront file</a:t>
+            </a:r>
+          </a:p>
+          <a:p>
+            <a:pPr lvl="1"/>
+            <a:r>
+              <a:rPr lang="en-GB" dirty="0">
+                <a:solidFill>
+                  <a:srgbClr val="FF0000"/>
+                </a:solidFill>
+              </a:rPr>
+              <a:t>Problems: Using multiple renderers uses more draw calls and more CPU overhead. Merging objects externally creates lots of files with </a:t>
+            </a:r>
+            <a:r>
+              <a:rPr lang="en-GB" dirty="0" err="1">
+                <a:solidFill>
+                  <a:srgbClr val="FF0000"/>
+                </a:solidFill>
+              </a:rPr>
+              <a:t>dupilacte</a:t>
+            </a:r>
+            <a:r>
+              <a:rPr lang="en-GB" dirty="0">
+                <a:solidFill>
+                  <a:srgbClr val="FF0000"/>
+                </a:solidFill>
+              </a:rPr>
+              <a:t> data; thus, wasting memory/storage space</a:t>
+            </a:r>
+          </a:p>
+          <a:p>
+            <a:pPr lvl="1"/>
+            <a:r>
+              <a:rPr lang="en-GB" dirty="0">
+                <a:solidFill>
+                  <a:srgbClr val="92D050"/>
+                </a:solidFill>
+              </a:rPr>
+              <a:t>Proposed solution: Develop a form of the model renderer than can use instancing or merging to reduce draw calls and decrease storage usage</a:t>
+            </a:r>
+          </a:p>
+          <a:p>
+            <a:r>
+              <a:rPr lang="en-GB" dirty="0"/>
+              <a:t>The mouse does not get locked to the window</a:t>
+            </a:r>
+          </a:p>
+          <a:p>
+            <a:pPr lvl="1"/>
+            <a:r>
+              <a:rPr lang="en-GB" dirty="0">
+                <a:solidFill>
+                  <a:srgbClr val="FF0000"/>
+                </a:solidFill>
+              </a:rPr>
+              <a:t>Problems: Looking around is clunky and not fit for purpose</a:t>
+            </a:r>
+          </a:p>
+          <a:p>
+            <a:pPr lvl="1"/>
+            <a:r>
+              <a:rPr lang="en-GB" dirty="0">
+                <a:solidFill>
+                  <a:srgbClr val="92D050"/>
+                </a:solidFill>
+              </a:rPr>
+              <a:t>Proposed solution: use SDL to keep the mouse in the centre of the window and slightly tweak how the mouse is tracked</a:t>
+            </a:r>
           </a:p>
         </p:txBody>
       </p:sp>
     </p:spTree>
     <p:extLst>
       <p:ext uri="{BB962C8B-B14F-4D97-AF65-F5344CB8AC3E}">
-        <p14:creationId xmlns:p14="http://schemas.microsoft.com/office/powerpoint/2010/main" val="1020114105"/>
+        <p14:creationId xmlns:p14="http://schemas.microsoft.com/office/powerpoint/2010/main" val="2549037029"/>
       </p:ext>
     </p:extLst>
   </p:cSld>

</xml_diff>